<commit_message>
Updated figs, added algorithms, added experiments
</commit_message>
<xml_diff>
--- a/papers/Case2016/pictures/SetUp.pptx
+++ b/papers/Case2016/pictures/SetUp.pptx
@@ -7,7 +7,7 @@
   <p:sldIdLst>
     <p:sldId id="257" r:id="rId2"/>
   </p:sldIdLst>
-  <p:sldSz cx="9144000" cy="6858000" type="screen4x3"/>
+  <p:sldSz cx="7772400" cy="6400800"/>
   <p:notesSz cx="6858000" cy="9144000"/>
   <p:defaultTextStyle>
     <a:defPPr>
@@ -136,8 +136,8 @@
         </p:nvSpPr>
         <p:spPr>
           <a:xfrm>
-            <a:off x="685800" y="2130425"/>
-            <a:ext cx="7772400" cy="1470025"/>
+            <a:off x="582930" y="1988398"/>
+            <a:ext cx="6606540" cy="1372023"/>
           </a:xfrm>
         </p:spPr>
         <p:txBody>
@@ -164,8 +164,8 @@
         </p:nvSpPr>
         <p:spPr>
           <a:xfrm>
-            <a:off x="1371600" y="3886200"/>
-            <a:ext cx="6400800" cy="1752600"/>
+            <a:off x="1165860" y="3627120"/>
+            <a:ext cx="5440680" cy="1635760"/>
           </a:xfrm>
         </p:spPr>
         <p:txBody>
@@ -288,7 +288,7 @@
           <a:p>
             <a:fld id="{F694978D-A894-E24D-9868-C9A03761E7E6}" type="datetimeFigureOut">
               <a:rPr lang="en-US" smtClean="0"/>
-              <a:t>3/5/16</a:t>
+              <a:t>3/19/16</a:t>
             </a:fld>
             <a:endParaRPr lang="en-US"/>
           </a:p>
@@ -458,7 +458,7 @@
           <a:p>
             <a:fld id="{F694978D-A894-E24D-9868-C9A03761E7E6}" type="datetimeFigureOut">
               <a:rPr lang="en-US" smtClean="0"/>
-              <a:t>3/5/16</a:t>
+              <a:t>3/19/16</a:t>
             </a:fld>
             <a:endParaRPr lang="en-US"/>
           </a:p>
@@ -548,8 +548,8 @@
         </p:nvSpPr>
         <p:spPr>
           <a:xfrm>
-            <a:off x="6629400" y="274638"/>
-            <a:ext cx="2057400" cy="5851525"/>
+            <a:off x="5634990" y="256330"/>
+            <a:ext cx="1748790" cy="5461423"/>
           </a:xfrm>
         </p:spPr>
         <p:txBody>
@@ -576,8 +576,8 @@
         </p:nvSpPr>
         <p:spPr>
           <a:xfrm>
-            <a:off x="457200" y="274638"/>
-            <a:ext cx="6019800" cy="5851525"/>
+            <a:off x="388620" y="256330"/>
+            <a:ext cx="5116830" cy="5461423"/>
           </a:xfrm>
         </p:spPr>
         <p:txBody>
@@ -638,7 +638,7 @@
           <a:p>
             <a:fld id="{F694978D-A894-E24D-9868-C9A03761E7E6}" type="datetimeFigureOut">
               <a:rPr lang="en-US" smtClean="0"/>
-              <a:t>3/5/16</a:t>
+              <a:t>3/19/16</a:t>
             </a:fld>
             <a:endParaRPr lang="en-US"/>
           </a:p>
@@ -808,7 +808,7 @@
           <a:p>
             <a:fld id="{F694978D-A894-E24D-9868-C9A03761E7E6}" type="datetimeFigureOut">
               <a:rPr lang="en-US" smtClean="0"/>
-              <a:t>3/5/16</a:t>
+              <a:t>3/19/16</a:t>
             </a:fld>
             <a:endParaRPr lang="en-US"/>
           </a:p>
@@ -898,8 +898,8 @@
         </p:nvSpPr>
         <p:spPr>
           <a:xfrm>
-            <a:off x="722313" y="4406900"/>
-            <a:ext cx="7772400" cy="1362075"/>
+            <a:off x="613966" y="4113108"/>
+            <a:ext cx="6606540" cy="1271270"/>
           </a:xfrm>
         </p:spPr>
         <p:txBody>
@@ -930,8 +930,8 @@
         </p:nvSpPr>
         <p:spPr>
           <a:xfrm>
-            <a:off x="722313" y="2906713"/>
-            <a:ext cx="7772400" cy="1500187"/>
+            <a:off x="613966" y="2712932"/>
+            <a:ext cx="6606540" cy="1400175"/>
           </a:xfrm>
         </p:spPr>
         <p:txBody>
@@ -1054,7 +1054,7 @@
           <a:p>
             <a:fld id="{F694978D-A894-E24D-9868-C9A03761E7E6}" type="datetimeFigureOut">
               <a:rPr lang="en-US" smtClean="0"/>
-              <a:t>3/5/16</a:t>
+              <a:t>3/19/16</a:t>
             </a:fld>
             <a:endParaRPr lang="en-US"/>
           </a:p>
@@ -1167,8 +1167,8 @@
         </p:nvSpPr>
         <p:spPr>
           <a:xfrm>
-            <a:off x="457200" y="1600200"/>
-            <a:ext cx="4038600" cy="4525963"/>
+            <a:off x="388620" y="1493521"/>
+            <a:ext cx="3432810" cy="4224232"/>
           </a:xfrm>
         </p:spPr>
         <p:txBody>
@@ -1252,8 +1252,8 @@
         </p:nvSpPr>
         <p:spPr>
           <a:xfrm>
-            <a:off x="4648200" y="1600200"/>
-            <a:ext cx="4038600" cy="4525963"/>
+            <a:off x="3950970" y="1493521"/>
+            <a:ext cx="3432810" cy="4224232"/>
           </a:xfrm>
         </p:spPr>
         <p:txBody>
@@ -1342,7 +1342,7 @@
           <a:p>
             <a:fld id="{F694978D-A894-E24D-9868-C9A03761E7E6}" type="datetimeFigureOut">
               <a:rPr lang="en-US" smtClean="0"/>
-              <a:t>3/5/16</a:t>
+              <a:t>3/19/16</a:t>
             </a:fld>
             <a:endParaRPr lang="en-US"/>
           </a:p>
@@ -1459,8 +1459,8 @@
         </p:nvSpPr>
         <p:spPr>
           <a:xfrm>
-            <a:off x="457200" y="1535113"/>
-            <a:ext cx="4040188" cy="639762"/>
+            <a:off x="388620" y="1432772"/>
+            <a:ext cx="3434160" cy="597111"/>
           </a:xfrm>
         </p:spPr>
         <p:txBody>
@@ -1524,8 +1524,8 @@
         </p:nvSpPr>
         <p:spPr>
           <a:xfrm>
-            <a:off x="457200" y="2174875"/>
-            <a:ext cx="4040188" cy="3951288"/>
+            <a:off x="388620" y="2029883"/>
+            <a:ext cx="3434160" cy="3687869"/>
           </a:xfrm>
         </p:spPr>
         <p:txBody>
@@ -1609,8 +1609,8 @@
         </p:nvSpPr>
         <p:spPr>
           <a:xfrm>
-            <a:off x="4645025" y="1535113"/>
-            <a:ext cx="4041775" cy="639762"/>
+            <a:off x="3948273" y="1432772"/>
+            <a:ext cx="3435509" cy="597111"/>
           </a:xfrm>
         </p:spPr>
         <p:txBody>
@@ -1674,8 +1674,8 @@
         </p:nvSpPr>
         <p:spPr>
           <a:xfrm>
-            <a:off x="4645025" y="2174875"/>
-            <a:ext cx="4041775" cy="3951288"/>
+            <a:off x="3948273" y="2029883"/>
+            <a:ext cx="3435509" cy="3687869"/>
           </a:xfrm>
         </p:spPr>
         <p:txBody>
@@ -1764,7 +1764,7 @@
           <a:p>
             <a:fld id="{F694978D-A894-E24D-9868-C9A03761E7E6}" type="datetimeFigureOut">
               <a:rPr lang="en-US" smtClean="0"/>
-              <a:t>3/5/16</a:t>
+              <a:t>3/19/16</a:t>
             </a:fld>
             <a:endParaRPr lang="en-US"/>
           </a:p>
@@ -1882,7 +1882,7 @@
           <a:p>
             <a:fld id="{F694978D-A894-E24D-9868-C9A03761E7E6}" type="datetimeFigureOut">
               <a:rPr lang="en-US" smtClean="0"/>
-              <a:t>3/5/16</a:t>
+              <a:t>3/19/16</a:t>
             </a:fld>
             <a:endParaRPr lang="en-US"/>
           </a:p>
@@ -1977,7 +1977,7 @@
           <a:p>
             <a:fld id="{F694978D-A894-E24D-9868-C9A03761E7E6}" type="datetimeFigureOut">
               <a:rPr lang="en-US" smtClean="0"/>
-              <a:t>3/5/16</a:t>
+              <a:t>3/19/16</a:t>
             </a:fld>
             <a:endParaRPr lang="en-US"/>
           </a:p>
@@ -2067,8 +2067,8 @@
         </p:nvSpPr>
         <p:spPr>
           <a:xfrm>
-            <a:off x="457200" y="273050"/>
-            <a:ext cx="3008313" cy="1162050"/>
+            <a:off x="388620" y="254847"/>
+            <a:ext cx="2557066" cy="1084580"/>
           </a:xfrm>
         </p:spPr>
         <p:txBody>
@@ -2099,8 +2099,8 @@
         </p:nvSpPr>
         <p:spPr>
           <a:xfrm>
-            <a:off x="3575050" y="273050"/>
-            <a:ext cx="5111750" cy="5853113"/>
+            <a:off x="3038792" y="254848"/>
+            <a:ext cx="4344988" cy="5462905"/>
           </a:xfrm>
         </p:spPr>
         <p:txBody>
@@ -2184,8 +2184,8 @@
         </p:nvSpPr>
         <p:spPr>
           <a:xfrm>
-            <a:off x="457200" y="1435100"/>
-            <a:ext cx="3008313" cy="4691063"/>
+            <a:off x="388620" y="1339428"/>
+            <a:ext cx="2557066" cy="4378325"/>
           </a:xfrm>
         </p:spPr>
         <p:txBody>
@@ -2254,7 +2254,7 @@
           <a:p>
             <a:fld id="{F694978D-A894-E24D-9868-C9A03761E7E6}" type="datetimeFigureOut">
               <a:rPr lang="en-US" smtClean="0"/>
-              <a:t>3/5/16</a:t>
+              <a:t>3/19/16</a:t>
             </a:fld>
             <a:endParaRPr lang="en-US"/>
           </a:p>
@@ -2344,8 +2344,8 @@
         </p:nvSpPr>
         <p:spPr>
           <a:xfrm>
-            <a:off x="1792288" y="4800600"/>
-            <a:ext cx="5486400" cy="566738"/>
+            <a:off x="1523445" y="4480560"/>
+            <a:ext cx="4663440" cy="528955"/>
           </a:xfrm>
         </p:spPr>
         <p:txBody>
@@ -2376,8 +2376,8 @@
         </p:nvSpPr>
         <p:spPr>
           <a:xfrm>
-            <a:off x="1792288" y="612775"/>
-            <a:ext cx="5486400" cy="4114800"/>
+            <a:off x="1523445" y="571923"/>
+            <a:ext cx="4663440" cy="3840480"/>
           </a:xfrm>
         </p:spPr>
         <p:txBody>
@@ -2437,8 +2437,8 @@
         </p:nvSpPr>
         <p:spPr>
           <a:xfrm>
-            <a:off x="1792288" y="5367338"/>
-            <a:ext cx="5486400" cy="804862"/>
+            <a:off x="1523445" y="5009515"/>
+            <a:ext cx="4663440" cy="751205"/>
           </a:xfrm>
         </p:spPr>
         <p:txBody>
@@ -2507,7 +2507,7 @@
           <a:p>
             <a:fld id="{F694978D-A894-E24D-9868-C9A03761E7E6}" type="datetimeFigureOut">
               <a:rPr lang="en-US" smtClean="0"/>
-              <a:t>3/5/16</a:t>
+              <a:t>3/19/16</a:t>
             </a:fld>
             <a:endParaRPr lang="en-US"/>
           </a:p>
@@ -2602,8 +2602,8 @@
         </p:nvSpPr>
         <p:spPr>
           <a:xfrm>
-            <a:off x="457200" y="274638"/>
-            <a:ext cx="8229600" cy="1143000"/>
+            <a:off x="388620" y="256329"/>
+            <a:ext cx="6995160" cy="1066800"/>
           </a:xfrm>
           <a:prstGeom prst="rect">
             <a:avLst/>
@@ -2635,8 +2635,8 @@
         </p:nvSpPr>
         <p:spPr>
           <a:xfrm>
-            <a:off x="457200" y="1600200"/>
-            <a:ext cx="8229600" cy="4525963"/>
+            <a:off x="388620" y="1493521"/>
+            <a:ext cx="6995160" cy="4224232"/>
           </a:xfrm>
           <a:prstGeom prst="rect">
             <a:avLst/>
@@ -2697,8 +2697,8 @@
         </p:nvSpPr>
         <p:spPr>
           <a:xfrm>
-            <a:off x="457200" y="6356350"/>
-            <a:ext cx="2133600" cy="365125"/>
+            <a:off x="388620" y="5932595"/>
+            <a:ext cx="1813560" cy="340783"/>
           </a:xfrm>
           <a:prstGeom prst="rect">
             <a:avLst/>
@@ -2720,7 +2720,7 @@
           <a:p>
             <a:fld id="{F694978D-A894-E24D-9868-C9A03761E7E6}" type="datetimeFigureOut">
               <a:rPr lang="en-US" smtClean="0"/>
-              <a:t>3/5/16</a:t>
+              <a:t>3/19/16</a:t>
             </a:fld>
             <a:endParaRPr lang="en-US"/>
           </a:p>
@@ -2738,8 +2738,8 @@
         </p:nvSpPr>
         <p:spPr>
           <a:xfrm>
-            <a:off x="3124200" y="6356350"/>
-            <a:ext cx="2895600" cy="365125"/>
+            <a:off x="2655570" y="5932595"/>
+            <a:ext cx="2461260" cy="340783"/>
           </a:xfrm>
           <a:prstGeom prst="rect">
             <a:avLst/>
@@ -2775,8 +2775,8 @@
         </p:nvSpPr>
         <p:spPr>
           <a:xfrm>
-            <a:off x="6553200" y="6356350"/>
-            <a:ext cx="2133600" cy="365125"/>
+            <a:off x="5570220" y="5932595"/>
+            <a:ext cx="1813560" cy="340783"/>
           </a:xfrm>
           <a:prstGeom prst="rect">
             <a:avLst/>
@@ -3097,9 +3097,9 @@
       </p:grpSpPr>
       <p:cxnSp>
         <p:nvCxnSpPr>
-          <p:cNvPr id="6" name="Straight Arrow Connector 5"/>
+          <p:cNvPr id="57" name="Straight Arrow Connector 56"/>
           <p:cNvCxnSpPr>
-            <a:stCxn id="7" idx="2"/>
+            <a:stCxn id="58" idx="2"/>
           </p:cNvCxnSpPr>
           <p:nvPr/>
         </p:nvCxnSpPr>
@@ -3132,7 +3132,7 @@
       </p:cxnSp>
       <p:sp>
         <p:nvSpPr>
-          <p:cNvPr id="7" name="TextBox 6"/>
+          <p:cNvPr id="58" name="TextBox 57"/>
           <p:cNvSpPr txBox="1"/>
           <p:nvPr/>
         </p:nvSpPr>
@@ -3168,7 +3168,7 @@
       </p:sp>
       <p:sp>
         <p:nvSpPr>
-          <p:cNvPr id="8" name="TextBox 7"/>
+          <p:cNvPr id="59" name="TextBox 58"/>
           <p:cNvSpPr txBox="1"/>
           <p:nvPr/>
         </p:nvSpPr>
@@ -3204,9 +3204,9 @@
       </p:sp>
       <p:cxnSp>
         <p:nvCxnSpPr>
-          <p:cNvPr id="9" name="Straight Arrow Connector 8"/>
+          <p:cNvPr id="60" name="Straight Arrow Connector 59"/>
           <p:cNvCxnSpPr>
-            <a:stCxn id="8" idx="0"/>
+            <a:stCxn id="59" idx="0"/>
           </p:cNvCxnSpPr>
           <p:nvPr/>
         </p:nvCxnSpPr>
@@ -3239,7 +3239,7 @@
       </p:cxnSp>
       <p:cxnSp>
         <p:nvCxnSpPr>
-          <p:cNvPr id="14" name="Straight Arrow Connector 13"/>
+          <p:cNvPr id="61" name="Straight Arrow Connector 60"/>
           <p:cNvCxnSpPr/>
           <p:nvPr/>
         </p:nvCxnSpPr>
@@ -3272,7 +3272,7 @@
       </p:cxnSp>
       <p:sp>
         <p:nvSpPr>
-          <p:cNvPr id="15" name="TextBox 14"/>
+          <p:cNvPr id="62" name="TextBox 61"/>
           <p:cNvSpPr txBox="1"/>
           <p:nvPr/>
         </p:nvSpPr>
@@ -3308,9 +3308,9 @@
       </p:sp>
       <p:cxnSp>
         <p:nvCxnSpPr>
-          <p:cNvPr id="19" name="Straight Arrow Connector 18"/>
+          <p:cNvPr id="63" name="Straight Arrow Connector 62"/>
           <p:cNvCxnSpPr>
-            <a:stCxn id="20" idx="2"/>
+            <a:stCxn id="64" idx="2"/>
           </p:cNvCxnSpPr>
           <p:nvPr/>
         </p:nvCxnSpPr>
@@ -3343,7 +3343,7 @@
       </p:cxnSp>
       <p:sp>
         <p:nvSpPr>
-          <p:cNvPr id="20" name="TextBox 19"/>
+          <p:cNvPr id="64" name="TextBox 63"/>
           <p:cNvSpPr txBox="1"/>
           <p:nvPr/>
         </p:nvSpPr>
@@ -3379,7 +3379,7 @@
       </p:sp>
       <p:cxnSp>
         <p:nvCxnSpPr>
-          <p:cNvPr id="22" name="Straight Arrow Connector 21"/>
+          <p:cNvPr id="65" name="Straight Arrow Connector 64"/>
           <p:cNvCxnSpPr/>
           <p:nvPr/>
         </p:nvCxnSpPr>
@@ -3416,7 +3416,7 @@
       </p:cxnSp>
       <p:sp>
         <p:nvSpPr>
-          <p:cNvPr id="27" name="TextBox 26"/>
+          <p:cNvPr id="66" name="TextBox 65"/>
           <p:cNvSpPr txBox="1"/>
           <p:nvPr/>
         </p:nvSpPr>
@@ -3452,7 +3452,7 @@
       </p:sp>
       <p:cxnSp>
         <p:nvCxnSpPr>
-          <p:cNvPr id="29" name="Straight Arrow Connector 28"/>
+          <p:cNvPr id="67" name="Straight Arrow Connector 66"/>
           <p:cNvCxnSpPr/>
           <p:nvPr/>
         </p:nvCxnSpPr>
@@ -3489,7 +3489,7 @@
       </p:cxnSp>
       <p:sp>
         <p:nvSpPr>
-          <p:cNvPr id="30" name="TextBox 29"/>
+          <p:cNvPr id="68" name="TextBox 67"/>
           <p:cNvSpPr txBox="1"/>
           <p:nvPr/>
         </p:nvSpPr>
@@ -3525,7 +3525,7 @@
       </p:sp>
       <p:sp>
         <p:nvSpPr>
-          <p:cNvPr id="37" name="TextBox 36"/>
+          <p:cNvPr id="69" name="TextBox 68"/>
           <p:cNvSpPr txBox="1"/>
           <p:nvPr/>
         </p:nvSpPr>
@@ -3557,7 +3557,7 @@
       </p:sp>
       <p:pic>
         <p:nvPicPr>
-          <p:cNvPr id="42" name="Picture 41" descr="Webcam.jpg"/>
+          <p:cNvPr id="70" name="Picture 69" descr="Webcam.jpg"/>
           <p:cNvPicPr>
             <a:picLocks noChangeAspect="1"/>
           </p:cNvPicPr>
@@ -3587,7 +3587,7 @@
       </p:pic>
       <p:pic>
         <p:nvPicPr>
-          <p:cNvPr id="43" name="Picture 42" descr="Light1.jpg"/>
+          <p:cNvPr id="71" name="Picture 70" descr="Light1.jpg"/>
           <p:cNvPicPr>
             <a:picLocks noChangeAspect="1"/>
           </p:cNvPicPr>
@@ -3617,7 +3617,7 @@
       </p:pic>
       <p:pic>
         <p:nvPicPr>
-          <p:cNvPr id="44" name="Picture 43" descr="Light2.jpg"/>
+          <p:cNvPr id="72" name="Picture 71" descr="Light2.jpg"/>
           <p:cNvPicPr>
             <a:picLocks noChangeAspect="1"/>
           </p:cNvPicPr>
@@ -3647,7 +3647,7 @@
       </p:pic>
       <p:cxnSp>
         <p:nvCxnSpPr>
-          <p:cNvPr id="46" name="Straight Arrow Connector 45"/>
+          <p:cNvPr id="73" name="Straight Arrow Connector 72"/>
           <p:cNvCxnSpPr/>
           <p:nvPr/>
         </p:nvCxnSpPr>
@@ -3684,7 +3684,7 @@
       </p:cxnSp>
       <p:sp>
         <p:nvSpPr>
-          <p:cNvPr id="47" name="TextBox 46"/>
+          <p:cNvPr id="74" name="TextBox 73"/>
           <p:cNvSpPr txBox="1"/>
           <p:nvPr/>
         </p:nvSpPr>
@@ -3727,7 +3727,7 @@
       </p:sp>
       <p:pic>
         <p:nvPicPr>
-          <p:cNvPr id="11" name="Picture 10" descr="Kilobot.png"/>
+          <p:cNvPr id="75" name="Picture 74" descr="Kilobot.png"/>
           <p:cNvPicPr>
             <a:picLocks noChangeAspect="1"/>
           </p:cNvPicPr>
@@ -3757,7 +3757,7 @@
       </p:pic>
       <p:pic>
         <p:nvPicPr>
-          <p:cNvPr id="2" name="Picture 1" descr="IMG_2356.png"/>
+          <p:cNvPr id="76" name="Picture 75" descr="IMG_2356.png"/>
           <p:cNvPicPr>
             <a:picLocks noChangeAspect="1"/>
           </p:cNvPicPr>
@@ -3787,7 +3787,7 @@
       </p:pic>
       <p:sp>
         <p:nvSpPr>
-          <p:cNvPr id="28" name="Arc 27"/>
+          <p:cNvPr id="77" name="Arc 76"/>
           <p:cNvSpPr/>
           <p:nvPr/>
         </p:nvSpPr>
@@ -3828,7 +3828,7 @@
       </p:sp>
       <p:sp>
         <p:nvSpPr>
-          <p:cNvPr id="31" name="Arc 30"/>
+          <p:cNvPr id="78" name="Arc 77"/>
           <p:cNvSpPr/>
           <p:nvPr/>
         </p:nvSpPr>

</xml_diff>